<commit_message>
1. Modify GCM instruction.pptx
</commit_message>
<xml_diff>
--- a/CustomerUIDemo/GCM instruction.pptx
+++ b/CustomerUIDemo/GCM instruction.pptx
@@ -231,7 +231,7 @@
           <a:p>
             <a:fld id="{E999E3F6-2B46-4632-8D41-3674A0205DB8}" type="datetimeFigureOut">
               <a:rPr lang="zh-TW" altLang="en-US" smtClean="0"/>
-              <a:t>2015/11/26</a:t>
+              <a:t>2015/11/27</a:t>
             </a:fld>
             <a:endParaRPr lang="zh-TW" altLang="en-US"/>
           </a:p>
@@ -848,7 +848,7 @@
           <a:p>
             <a:fld id="{5BBEAD13-0566-4C6C-97E7-55F17F24B09F}" type="datetimeFigureOut">
               <a:rPr lang="zh-TW" altLang="en-US" smtClean="0"/>
-              <a:t>2015/11/26</a:t>
+              <a:t>2015/11/27</a:t>
             </a:fld>
             <a:endParaRPr lang="zh-TW" altLang="en-US"/>
           </a:p>
@@ -1013,7 +1013,7 @@
           <a:p>
             <a:fld id="{5BBEAD13-0566-4C6C-97E7-55F17F24B09F}" type="datetimeFigureOut">
               <a:rPr lang="zh-TW" altLang="en-US" smtClean="0"/>
-              <a:t>2015/11/26</a:t>
+              <a:t>2015/11/27</a:t>
             </a:fld>
             <a:endParaRPr lang="zh-TW" altLang="en-US"/>
           </a:p>
@@ -1188,7 +1188,7 @@
           <a:p>
             <a:fld id="{5BBEAD13-0566-4C6C-97E7-55F17F24B09F}" type="datetimeFigureOut">
               <a:rPr lang="zh-TW" altLang="en-US" smtClean="0"/>
-              <a:t>2015/11/26</a:t>
+              <a:t>2015/11/27</a:t>
             </a:fld>
             <a:endParaRPr lang="zh-TW" altLang="en-US"/>
           </a:p>
@@ -1353,7 +1353,7 @@
           <a:p>
             <a:fld id="{5BBEAD13-0566-4C6C-97E7-55F17F24B09F}" type="datetimeFigureOut">
               <a:rPr lang="zh-TW" altLang="en-US" smtClean="0"/>
-              <a:t>2015/11/26</a:t>
+              <a:t>2015/11/27</a:t>
             </a:fld>
             <a:endParaRPr lang="zh-TW" altLang="en-US"/>
           </a:p>
@@ -1594,7 +1594,7 @@
           <a:p>
             <a:fld id="{5BBEAD13-0566-4C6C-97E7-55F17F24B09F}" type="datetimeFigureOut">
               <a:rPr lang="zh-TW" altLang="en-US" smtClean="0"/>
-              <a:t>2015/11/26</a:t>
+              <a:t>2015/11/27</a:t>
             </a:fld>
             <a:endParaRPr lang="zh-TW" altLang="en-US"/>
           </a:p>
@@ -1877,7 +1877,7 @@
           <a:p>
             <a:fld id="{5BBEAD13-0566-4C6C-97E7-55F17F24B09F}" type="datetimeFigureOut">
               <a:rPr lang="zh-TW" altLang="en-US" smtClean="0"/>
-              <a:t>2015/11/26</a:t>
+              <a:t>2015/11/27</a:t>
             </a:fld>
             <a:endParaRPr lang="zh-TW" altLang="en-US"/>
           </a:p>
@@ -2294,7 +2294,7 @@
           <a:p>
             <a:fld id="{5BBEAD13-0566-4C6C-97E7-55F17F24B09F}" type="datetimeFigureOut">
               <a:rPr lang="zh-TW" altLang="en-US" smtClean="0"/>
-              <a:t>2015/11/26</a:t>
+              <a:t>2015/11/27</a:t>
             </a:fld>
             <a:endParaRPr lang="zh-TW" altLang="en-US"/>
           </a:p>
@@ -2407,7 +2407,7 @@
           <a:p>
             <a:fld id="{5BBEAD13-0566-4C6C-97E7-55F17F24B09F}" type="datetimeFigureOut">
               <a:rPr lang="zh-TW" altLang="en-US" smtClean="0"/>
-              <a:t>2015/11/26</a:t>
+              <a:t>2015/11/27</a:t>
             </a:fld>
             <a:endParaRPr lang="zh-TW" altLang="en-US"/>
           </a:p>
@@ -2497,7 +2497,7 @@
           <a:p>
             <a:fld id="{5BBEAD13-0566-4C6C-97E7-55F17F24B09F}" type="datetimeFigureOut">
               <a:rPr lang="zh-TW" altLang="en-US" smtClean="0"/>
-              <a:t>2015/11/26</a:t>
+              <a:t>2015/11/27</a:t>
             </a:fld>
             <a:endParaRPr lang="zh-TW" altLang="en-US"/>
           </a:p>
@@ -2769,7 +2769,7 @@
           <a:p>
             <a:fld id="{5BBEAD13-0566-4C6C-97E7-55F17F24B09F}" type="datetimeFigureOut">
               <a:rPr lang="zh-TW" altLang="en-US" smtClean="0"/>
-              <a:t>2015/11/26</a:t>
+              <a:t>2015/11/27</a:t>
             </a:fld>
             <a:endParaRPr lang="zh-TW" altLang="en-US"/>
           </a:p>
@@ -3017,7 +3017,7 @@
           <a:p>
             <a:fld id="{5BBEAD13-0566-4C6C-97E7-55F17F24B09F}" type="datetimeFigureOut">
               <a:rPr lang="zh-TW" altLang="en-US" smtClean="0"/>
-              <a:t>2015/11/26</a:t>
+              <a:t>2015/11/27</a:t>
             </a:fld>
             <a:endParaRPr lang="zh-TW" altLang="en-US"/>
           </a:p>
@@ -3225,7 +3225,7 @@
           <a:p>
             <a:fld id="{5BBEAD13-0566-4C6C-97E7-55F17F24B09F}" type="datetimeFigureOut">
               <a:rPr lang="zh-TW" altLang="en-US" smtClean="0"/>
-              <a:t>2015/11/26</a:t>
+              <a:t>2015/11/27</a:t>
             </a:fld>
             <a:endParaRPr lang="zh-TW" altLang="en-US"/>
           </a:p>
@@ -3639,11 +3639,7 @@
           <a:p>
             <a:r>
               <a:rPr lang="en-US" altLang="zh-TW" dirty="0" smtClean="0"/>
-              <a:t>Author: Sonny </a:t>
-            </a:r>
-            <a:r>
-              <a:rPr lang="en-US" altLang="zh-TW" dirty="0" smtClean="0"/>
-              <a:t>Shih</a:t>
+              <a:t>Author: Sonny Shih</a:t>
             </a:r>
           </a:p>
           <a:p>
@@ -9367,11 +9363,7 @@
           <a:p>
             <a:r>
               <a:rPr lang="en-US" altLang="zh-TW" dirty="0"/>
-              <a:t>Downstream </a:t>
-            </a:r>
-            <a:r>
-              <a:rPr lang="en-US" altLang="zh-TW" dirty="0"/>
-              <a:t>Messaging </a:t>
+              <a:t>Downstream Messaging </a:t>
             </a:r>
             <a:r>
               <a:rPr lang="en-US" altLang="zh-TW" dirty="0" smtClean="0"/>
@@ -9540,11 +9532,7 @@
           <a:p>
             <a:r>
               <a:rPr lang="en-US" altLang="zh-TW" dirty="0"/>
-              <a:t>Downstream </a:t>
-            </a:r>
-            <a:r>
-              <a:rPr lang="en-US" altLang="zh-TW" dirty="0"/>
-              <a:t>Messaging </a:t>
+              <a:t>Downstream Messaging </a:t>
             </a:r>
             <a:r>
               <a:rPr lang="en-US" altLang="zh-TW" dirty="0" smtClean="0"/>
@@ -9915,11 +9903,7 @@
           <a:p>
             <a:r>
               <a:rPr lang="en-US" altLang="zh-TW" dirty="0"/>
-              <a:t>Downstream </a:t>
-            </a:r>
-            <a:r>
-              <a:rPr lang="en-US" altLang="zh-TW" dirty="0"/>
-              <a:t>Messaging </a:t>
+              <a:t>Downstream Messaging </a:t>
             </a:r>
             <a:r>
               <a:rPr lang="en-US" altLang="zh-TW" dirty="0" smtClean="0"/>
@@ -10462,11 +10446,7 @@
           <a:p>
             <a:r>
               <a:rPr lang="en-US" altLang="zh-TW" dirty="0"/>
-              <a:t>Downstream </a:t>
-            </a:r>
-            <a:r>
-              <a:rPr lang="en-US" altLang="zh-TW" dirty="0"/>
-              <a:t>Messaging </a:t>
+              <a:t>Downstream Messaging </a:t>
             </a:r>
             <a:r>
               <a:rPr lang="en-US" altLang="zh-TW" dirty="0" smtClean="0"/>
@@ -11275,11 +11255,7 @@
           <a:p>
             <a:r>
               <a:rPr lang="en-US" altLang="zh-TW" dirty="0"/>
-              <a:t>Downstream </a:t>
-            </a:r>
-            <a:r>
-              <a:rPr lang="en-US" altLang="zh-TW" dirty="0"/>
-              <a:t>Messaging </a:t>
+              <a:t>Downstream Messaging </a:t>
             </a:r>
             <a:r>
               <a:rPr lang="en-US" altLang="zh-TW" dirty="0" smtClean="0"/>
@@ -11289,7 +11265,6 @@
               <a:rPr lang="en-US" altLang="zh-TW" dirty="0"/>
               <a:t>)</a:t>
             </a:r>
-            <a:endParaRPr lang="en-US" altLang="zh-TW" dirty="0"/>
           </a:p>
         </p:txBody>
       </p:sp>
@@ -11381,11 +11356,7 @@
           <a:p>
             <a:r>
               <a:rPr lang="en-US" altLang="zh-TW" dirty="0"/>
-              <a:t>Topics </a:t>
-            </a:r>
-            <a:r>
-              <a:rPr lang="en-US" altLang="zh-TW" dirty="0"/>
-              <a:t>Messaging </a:t>
+              <a:t>Topics Messaging </a:t>
             </a:r>
             <a:r>
               <a:rPr lang="en-US" altLang="zh-TW" dirty="0" smtClean="0"/>
@@ -11921,6 +11892,30 @@
               <a:rPr lang="en-US" altLang="zh-TW" dirty="0" err="1" smtClean="0"/>
               <a:t>InstanceIDListenerService</a:t>
             </a:r>
+            <a:r>
+              <a:rPr lang="en-US" altLang="zh-TW" dirty="0"/>
+              <a:t> </a:t>
+            </a:r>
+            <a:r>
+              <a:rPr lang="en-US" altLang="zh-TW" dirty="0" smtClean="0"/>
+              <a:t>(</a:t>
+            </a:r>
+            <a:r>
+              <a:rPr lang="en-US" altLang="zh-TW" dirty="0" err="1" smtClean="0"/>
+              <a:t>為了避免token</a:t>
+            </a:r>
+            <a:r>
+              <a:rPr lang="en-US" altLang="zh-TW" err="1" smtClean="0"/>
+              <a:t>重復使用</a:t>
+            </a:r>
+            <a:r>
+              <a:rPr lang="en-US" altLang="zh-TW" smtClean="0"/>
+              <a:t>，所以會每隔一段時間就更新token)</a:t>
+            </a:r>
+            <a:r>
+              <a:rPr lang="zh-TW" altLang="en-US" dirty="0" smtClean="0"/>
+              <a:t>。</a:t>
+            </a:r>
             <a:endParaRPr lang="en-US" altLang="zh-TW" dirty="0" smtClean="0"/>
           </a:p>
           <a:p>
@@ -11928,10 +11923,16 @@
               <a:buNone/>
             </a:pPr>
             <a:r>
+              <a:rPr lang="en-US" altLang="zh-TW" sz="1400" dirty="0" smtClean="0">
+                <a:latin typeface="+mn-ea"/>
+              </a:rPr>
+              <a:t>&lt;</a:t>
+            </a:r>
+            <a:r>
               <a:rPr lang="en-US" altLang="zh-TW" sz="1400" dirty="0">
                 <a:latin typeface="+mn-ea"/>
               </a:rPr>
-              <a:t>&lt;service</a:t>
+              <a:t>service</a:t>
             </a:r>
           </a:p>
           <a:p>
@@ -12503,13 +12504,8 @@
             </a:r>
             <a:r>
               <a:rPr lang="en-US" altLang="zh-TW" dirty="0" smtClean="0"/>
-              <a:t> (</a:t>
-            </a:r>
-            <a:r>
-              <a:rPr lang="en-US" altLang="zh-TW" dirty="0" smtClean="0"/>
-              <a:t>1/3)</a:t>
-            </a:r>
-            <a:endParaRPr lang="en-US" altLang="zh-TW" dirty="0" smtClean="0"/>
+              <a:t> (1/3)</a:t>
+            </a:r>
           </a:p>
           <a:p>
             <a:pPr lvl="1"/>
@@ -12697,7 +12693,6 @@
               <a:rPr lang="en-US" altLang="zh-TW" dirty="0" smtClean="0"/>
               <a:t>(2/3)</a:t>
             </a:r>
-            <a:endParaRPr lang="en-US" altLang="zh-TW" dirty="0" smtClean="0"/>
           </a:p>
           <a:p>
             <a:pPr lvl="1"/>

</xml_diff>